<commit_message>
start data types and improved design; links doesnt work yet
</commit_message>
<xml_diff>
--- a/inst/tutorials/tutorial_2/images/shadow.pptx
+++ b/inst/tutorials/tutorial_2/images/shadow.pptx
@@ -264,7 +264,7 @@
           <a:p>
             <a:fld id="{FA3874A1-BFDD-4839-AF08-EC978EFE8D7D}" type="datetimeFigureOut">
               <a:rPr lang="de-DE" smtClean="0"/>
-              <a:t>16.06.2023</a:t>
+              <a:t>19.06.2023</a:t>
             </a:fld>
             <a:endParaRPr lang="de-DE"/>
           </a:p>
@@ -462,7 +462,7 @@
           <a:p>
             <a:fld id="{FA3874A1-BFDD-4839-AF08-EC978EFE8D7D}" type="datetimeFigureOut">
               <a:rPr lang="de-DE" smtClean="0"/>
-              <a:t>16.06.2023</a:t>
+              <a:t>19.06.2023</a:t>
             </a:fld>
             <a:endParaRPr lang="de-DE"/>
           </a:p>
@@ -670,7 +670,7 @@
           <a:p>
             <a:fld id="{FA3874A1-BFDD-4839-AF08-EC978EFE8D7D}" type="datetimeFigureOut">
               <a:rPr lang="de-DE" smtClean="0"/>
-              <a:t>16.06.2023</a:t>
+              <a:t>19.06.2023</a:t>
             </a:fld>
             <a:endParaRPr lang="de-DE"/>
           </a:p>
@@ -868,7 +868,7 @@
           <a:p>
             <a:fld id="{FA3874A1-BFDD-4839-AF08-EC978EFE8D7D}" type="datetimeFigureOut">
               <a:rPr lang="de-DE" smtClean="0"/>
-              <a:t>16.06.2023</a:t>
+              <a:t>19.06.2023</a:t>
             </a:fld>
             <a:endParaRPr lang="de-DE"/>
           </a:p>
@@ -1143,7 +1143,7 @@
           <a:p>
             <a:fld id="{FA3874A1-BFDD-4839-AF08-EC978EFE8D7D}" type="datetimeFigureOut">
               <a:rPr lang="de-DE" smtClean="0"/>
-              <a:t>16.06.2023</a:t>
+              <a:t>19.06.2023</a:t>
             </a:fld>
             <a:endParaRPr lang="de-DE"/>
           </a:p>
@@ -1408,7 +1408,7 @@
           <a:p>
             <a:fld id="{FA3874A1-BFDD-4839-AF08-EC978EFE8D7D}" type="datetimeFigureOut">
               <a:rPr lang="de-DE" smtClean="0"/>
-              <a:t>16.06.2023</a:t>
+              <a:t>19.06.2023</a:t>
             </a:fld>
             <a:endParaRPr lang="de-DE"/>
           </a:p>
@@ -1820,7 +1820,7 @@
           <a:p>
             <a:fld id="{FA3874A1-BFDD-4839-AF08-EC978EFE8D7D}" type="datetimeFigureOut">
               <a:rPr lang="de-DE" smtClean="0"/>
-              <a:t>16.06.2023</a:t>
+              <a:t>19.06.2023</a:t>
             </a:fld>
             <a:endParaRPr lang="de-DE"/>
           </a:p>
@@ -1961,7 +1961,7 @@
           <a:p>
             <a:fld id="{FA3874A1-BFDD-4839-AF08-EC978EFE8D7D}" type="datetimeFigureOut">
               <a:rPr lang="de-DE" smtClean="0"/>
-              <a:t>16.06.2023</a:t>
+              <a:t>19.06.2023</a:t>
             </a:fld>
             <a:endParaRPr lang="de-DE"/>
           </a:p>
@@ -2074,7 +2074,7 @@
           <a:p>
             <a:fld id="{FA3874A1-BFDD-4839-AF08-EC978EFE8D7D}" type="datetimeFigureOut">
               <a:rPr lang="de-DE" smtClean="0"/>
-              <a:t>16.06.2023</a:t>
+              <a:t>19.06.2023</a:t>
             </a:fld>
             <a:endParaRPr lang="de-DE"/>
           </a:p>
@@ -2385,7 +2385,7 @@
           <a:p>
             <a:fld id="{FA3874A1-BFDD-4839-AF08-EC978EFE8D7D}" type="datetimeFigureOut">
               <a:rPr lang="de-DE" smtClean="0"/>
-              <a:t>16.06.2023</a:t>
+              <a:t>19.06.2023</a:t>
             </a:fld>
             <a:endParaRPr lang="de-DE"/>
           </a:p>
@@ -2673,7 +2673,7 @@
           <a:p>
             <a:fld id="{FA3874A1-BFDD-4839-AF08-EC978EFE8D7D}" type="datetimeFigureOut">
               <a:rPr lang="de-DE" smtClean="0"/>
-              <a:t>16.06.2023</a:t>
+              <a:t>19.06.2023</a:t>
             </a:fld>
             <a:endParaRPr lang="de-DE"/>
           </a:p>
@@ -2914,7 +2914,7 @@
           <a:p>
             <a:fld id="{FA3874A1-BFDD-4839-AF08-EC978EFE8D7D}" type="datetimeFigureOut">
               <a:rPr lang="de-DE" smtClean="0"/>
-              <a:t>16.06.2023</a:t>
+              <a:t>19.06.2023</a:t>
             </a:fld>
             <a:endParaRPr lang="de-DE"/>
           </a:p>
@@ -4136,10 +4136,10 @@
       </p:grpSpPr>
       <p:grpSp>
         <p:nvGrpSpPr>
-          <p:cNvPr id="6" name="Gruppieren 5">
-            <a:extLst>
-              <a:ext uri="{FF2B5EF4-FFF2-40B4-BE49-F238E27FC236}">
-                <a16:creationId xmlns:a16="http://schemas.microsoft.com/office/drawing/2014/main" id="{75FBCEA8-B35A-1570-014D-2FB9B9687E58}"/>
+          <p:cNvPr id="2" name="Gruppieren 1">
+            <a:extLst>
+              <a:ext uri="{FF2B5EF4-FFF2-40B4-BE49-F238E27FC236}">
+                <a16:creationId xmlns:a16="http://schemas.microsoft.com/office/drawing/2014/main" id="{DE866468-BF87-0907-8771-8AEC61C708ED}"/>
               </a:ext>
             </a:extLst>
           </p:cNvPr>
@@ -4148,18 +4148,297 @@
         </p:nvGrpSpPr>
         <p:grpSpPr>
           <a:xfrm>
-            <a:off x="859330" y="1981356"/>
-            <a:ext cx="7955281" cy="2172004"/>
-            <a:chOff x="827799" y="672818"/>
-            <a:chExt cx="7955281" cy="2172004"/>
+            <a:off x="662261" y="331076"/>
+            <a:ext cx="7955281" cy="2844822"/>
+            <a:chOff x="859330" y="1308538"/>
+            <a:chExt cx="7955281" cy="2844822"/>
+          </a:xfrm>
+        </p:grpSpPr>
+        <p:grpSp>
+          <p:nvGrpSpPr>
+            <p:cNvPr id="6" name="Gruppieren 5">
+              <a:extLst>
+                <a:ext uri="{FF2B5EF4-FFF2-40B4-BE49-F238E27FC236}">
+                  <a16:creationId xmlns:a16="http://schemas.microsoft.com/office/drawing/2014/main" id="{75FBCEA8-B35A-1570-014D-2FB9B9687E58}"/>
+                </a:ext>
+              </a:extLst>
+            </p:cNvPr>
+            <p:cNvGrpSpPr/>
+            <p:nvPr/>
+          </p:nvGrpSpPr>
+          <p:grpSpPr>
+            <a:xfrm>
+              <a:off x="859330" y="1981356"/>
+              <a:ext cx="7955281" cy="2172004"/>
+              <a:chOff x="827799" y="672818"/>
+              <a:chExt cx="7955281" cy="2172004"/>
+            </a:xfrm>
+          </p:grpSpPr>
+          <p:pic>
+            <p:nvPicPr>
+              <p:cNvPr id="3" name="Grafik 2">
+                <a:extLst>
+                  <a:ext uri="{FF2B5EF4-FFF2-40B4-BE49-F238E27FC236}">
+                    <a16:creationId xmlns:a16="http://schemas.microsoft.com/office/drawing/2014/main" id="{767A147F-3C25-87BA-54A4-21C1449DBC38}"/>
+                  </a:ext>
+                </a:extLst>
+              </p:cNvPr>
+              <p:cNvPicPr>
+                <a:picLocks noChangeAspect="1"/>
+              </p:cNvPicPr>
+              <p:nvPr/>
+            </p:nvPicPr>
+            <p:blipFill>
+              <a:blip r:embed="rId2"/>
+              <a:stretch>
+                <a:fillRect/>
+              </a:stretch>
+            </p:blipFill>
+            <p:spPr>
+              <a:xfrm>
+                <a:off x="827799" y="672819"/>
+                <a:ext cx="4191585" cy="2172003"/>
+              </a:xfrm>
+              <a:prstGeom prst="rect">
+                <a:avLst/>
+              </a:prstGeom>
+              <a:ln>
+                <a:noFill/>
+              </a:ln>
+              <a:effectLst>
+                <a:outerShdw blurRad="292100" dist="139700" dir="2700000" algn="tl" rotWithShape="0">
+                  <a:srgbClr val="333333">
+                    <a:alpha val="65000"/>
+                  </a:srgbClr>
+                </a:outerShdw>
+              </a:effectLst>
+            </p:spPr>
+          </p:pic>
+          <p:pic>
+            <p:nvPicPr>
+              <p:cNvPr id="5" name="Grafik 4">
+                <a:extLst>
+                  <a:ext uri="{FF2B5EF4-FFF2-40B4-BE49-F238E27FC236}">
+                    <a16:creationId xmlns:a16="http://schemas.microsoft.com/office/drawing/2014/main" id="{123211F3-66EE-E98D-07A6-899DCB156E07}"/>
+                  </a:ext>
+                </a:extLst>
+              </p:cNvPr>
+              <p:cNvPicPr>
+                <a:picLocks noChangeAspect="1"/>
+              </p:cNvPicPr>
+              <p:nvPr/>
+            </p:nvPicPr>
+            <p:blipFill rotWithShape="1">
+              <a:blip r:embed="rId3"/>
+              <a:srcRect b="12977"/>
+              <a:stretch/>
+            </p:blipFill>
+            <p:spPr>
+              <a:xfrm>
+                <a:off x="5163075" y="672818"/>
+                <a:ext cx="3620005" cy="2172003"/>
+              </a:xfrm>
+              <a:prstGeom prst="rect">
+                <a:avLst/>
+              </a:prstGeom>
+              <a:ln>
+                <a:noFill/>
+              </a:ln>
+              <a:effectLst>
+                <a:outerShdw blurRad="292100" dist="139700" dir="2700000" algn="tl" rotWithShape="0">
+                  <a:srgbClr val="333333">
+                    <a:alpha val="65000"/>
+                  </a:srgbClr>
+                </a:outerShdw>
+              </a:effectLst>
+            </p:spPr>
+          </p:pic>
+        </p:grpSp>
+        <p:sp>
+          <p:nvSpPr>
+            <p:cNvPr id="7" name="Rechteck 6">
+              <a:extLst>
+                <a:ext uri="{FF2B5EF4-FFF2-40B4-BE49-F238E27FC236}">
+                  <a16:creationId xmlns:a16="http://schemas.microsoft.com/office/drawing/2014/main" id="{A7330D2F-0C2A-2424-CE69-881D30FD8524}"/>
+                </a:ext>
+              </a:extLst>
+            </p:cNvPr>
+            <p:cNvSpPr/>
+            <p:nvPr/>
+          </p:nvSpPr>
+          <p:spPr>
+            <a:xfrm>
+              <a:off x="5186833" y="1308538"/>
+              <a:ext cx="3436905" cy="583479"/>
+            </a:xfrm>
+            <a:prstGeom prst="rect">
+              <a:avLst/>
+            </a:prstGeom>
+            <a:noFill/>
+            <a:ln w="28575">
+              <a:solidFill>
+                <a:srgbClr val="CA225E"/>
+              </a:solidFill>
+            </a:ln>
+          </p:spPr>
+          <p:style>
+            <a:lnRef idx="2">
+              <a:schemeClr val="accent1">
+                <a:shade val="50000"/>
+              </a:schemeClr>
+            </a:lnRef>
+            <a:fillRef idx="1">
+              <a:schemeClr val="accent1"/>
+            </a:fillRef>
+            <a:effectRef idx="0">
+              <a:schemeClr val="accent1"/>
+            </a:effectRef>
+            <a:fontRef idx="minor">
+              <a:schemeClr val="lt1"/>
+            </a:fontRef>
+          </p:style>
+          <p:txBody>
+            <a:bodyPr rtlCol="0" anchor="ctr"/>
+            <a:lstStyle/>
+            <a:p>
+              <a:pPr algn="ctr"/>
+              <a:r>
+                <a:rPr lang="de-DE" dirty="0">
+                  <a:solidFill>
+                    <a:srgbClr val="CA225E"/>
+                  </a:solidFill>
+                </a:rPr>
+                <a:t>Konsolen Ausgabe nach dem Ausführen des R Skriptes</a:t>
+              </a:r>
+            </a:p>
+          </p:txBody>
+        </p:sp>
+        <p:sp>
+          <p:nvSpPr>
+            <p:cNvPr id="8" name="Rechteck 7">
+              <a:extLst>
+                <a:ext uri="{FF2B5EF4-FFF2-40B4-BE49-F238E27FC236}">
+                  <a16:creationId xmlns:a16="http://schemas.microsoft.com/office/drawing/2014/main" id="{E32F5C09-1CED-562B-2B00-A13403A05310}"/>
+                </a:ext>
+              </a:extLst>
+            </p:cNvPr>
+            <p:cNvSpPr/>
+            <p:nvPr/>
+          </p:nvSpPr>
+          <p:spPr>
+            <a:xfrm>
+              <a:off x="917137" y="1605764"/>
+              <a:ext cx="1150883" cy="331077"/>
+            </a:xfrm>
+            <a:prstGeom prst="rect">
+              <a:avLst/>
+            </a:prstGeom>
+            <a:noFill/>
+            <a:ln w="28575">
+              <a:solidFill>
+                <a:srgbClr val="CA225E"/>
+              </a:solidFill>
+            </a:ln>
+          </p:spPr>
+          <p:style>
+            <a:lnRef idx="2">
+              <a:schemeClr val="accent1">
+                <a:shade val="50000"/>
+              </a:schemeClr>
+            </a:lnRef>
+            <a:fillRef idx="1">
+              <a:schemeClr val="accent1"/>
+            </a:fillRef>
+            <a:effectRef idx="0">
+              <a:schemeClr val="accent1"/>
+            </a:effectRef>
+            <a:fontRef idx="minor">
+              <a:schemeClr val="lt1"/>
+            </a:fontRef>
+          </p:style>
+          <p:txBody>
+            <a:bodyPr rtlCol="0" anchor="ctr"/>
+            <a:lstStyle/>
+            <a:p>
+              <a:pPr algn="ctr"/>
+              <a:r>
+                <a:rPr lang="de-DE" dirty="0">
+                  <a:solidFill>
+                    <a:srgbClr val="CA225E"/>
+                  </a:solidFill>
+                </a:rPr>
+                <a:t>R Skript</a:t>
+              </a:r>
+            </a:p>
+          </p:txBody>
+        </p:sp>
+      </p:grpSp>
+      <p:pic>
+        <p:nvPicPr>
+          <p:cNvPr id="9" name="Grafik 8">
+            <a:extLst>
+              <a:ext uri="{FF2B5EF4-FFF2-40B4-BE49-F238E27FC236}">
+                <a16:creationId xmlns:a16="http://schemas.microsoft.com/office/drawing/2014/main" id="{69D40581-7E0D-E5E7-1012-7BC9BA3056BE}"/>
+              </a:ext>
+            </a:extLst>
+          </p:cNvPr>
+          <p:cNvPicPr>
+            <a:picLocks noChangeAspect="1"/>
+          </p:cNvPicPr>
+          <p:nvPr/>
+        </p:nvPicPr>
+        <p:blipFill>
+          <a:blip r:embed="rId4"/>
+          <a:stretch>
+            <a:fillRect/>
+          </a:stretch>
+        </p:blipFill>
+        <p:spPr>
+          <a:xfrm>
+            <a:off x="208728" y="2554014"/>
+            <a:ext cx="11774543" cy="2905530"/>
+          </a:xfrm>
+          <a:prstGeom prst="rect">
+            <a:avLst/>
+          </a:prstGeom>
+          <a:ln>
+            <a:noFill/>
+          </a:ln>
+          <a:effectLst>
+            <a:outerShdw blurRad="292100" dist="139700" dir="2700000" algn="tl" rotWithShape="0">
+              <a:srgbClr val="333333">
+                <a:alpha val="65000"/>
+              </a:srgbClr>
+            </a:outerShdw>
+          </a:effectLst>
+        </p:spPr>
+      </p:pic>
+      <p:grpSp>
+        <p:nvGrpSpPr>
+          <p:cNvPr id="13" name="Gruppieren 12">
+            <a:extLst>
+              <a:ext uri="{FF2B5EF4-FFF2-40B4-BE49-F238E27FC236}">
+                <a16:creationId xmlns:a16="http://schemas.microsoft.com/office/drawing/2014/main" id="{0C41F790-F775-6D10-3136-C1E75615BB20}"/>
+              </a:ext>
+            </a:extLst>
+          </p:cNvPr>
+          <p:cNvGrpSpPr/>
+          <p:nvPr/>
+        </p:nvGrpSpPr>
+        <p:grpSpPr>
+          <a:xfrm>
+            <a:off x="8675" y="4116331"/>
+            <a:ext cx="11974596" cy="2686425"/>
+            <a:chOff x="8675" y="4116331"/>
+            <a:chExt cx="11974596" cy="2686425"/>
           </a:xfrm>
         </p:grpSpPr>
         <p:pic>
           <p:nvPicPr>
-            <p:cNvPr id="3" name="Grafik 2">
+            <p:cNvPr id="11" name="Grafik 10">
               <a:extLst>
                 <a:ext uri="{FF2B5EF4-FFF2-40B4-BE49-F238E27FC236}">
-                  <a16:creationId xmlns:a16="http://schemas.microsoft.com/office/drawing/2014/main" id="{767A147F-3C25-87BA-54A4-21C1449DBC38}"/>
+                  <a16:creationId xmlns:a16="http://schemas.microsoft.com/office/drawing/2014/main" id="{8AB1E25D-5118-3B99-2946-B38E175C3BAC}"/>
                 </a:ext>
               </a:extLst>
             </p:cNvPr>
@@ -4169,15 +4448,15 @@
             <p:nvPr/>
           </p:nvPicPr>
           <p:blipFill>
-            <a:blip r:embed="rId2"/>
+            <a:blip r:embed="rId5"/>
             <a:stretch>
               <a:fillRect/>
             </a:stretch>
           </p:blipFill>
           <p:spPr>
             <a:xfrm>
-              <a:off x="827799" y="672819"/>
-              <a:ext cx="4191585" cy="2172003"/>
+              <a:off x="8675" y="4116331"/>
+              <a:ext cx="11974596" cy="2686425"/>
             </a:xfrm>
             <a:prstGeom prst="rect">
               <a:avLst/>
@@ -4194,164 +4473,59 @@
             </a:effectLst>
           </p:spPr>
         </p:pic>
-        <p:pic>
-          <p:nvPicPr>
-            <p:cNvPr id="5" name="Grafik 4">
+        <p:sp>
+          <p:nvSpPr>
+            <p:cNvPr id="12" name="Rechteck 11">
               <a:extLst>
                 <a:ext uri="{FF2B5EF4-FFF2-40B4-BE49-F238E27FC236}">
-                  <a16:creationId xmlns:a16="http://schemas.microsoft.com/office/drawing/2014/main" id="{123211F3-66EE-E98D-07A6-899DCB156E07}"/>
+                  <a16:creationId xmlns:a16="http://schemas.microsoft.com/office/drawing/2014/main" id="{A4E3A79D-D85F-C9DF-FFDA-092A7B17C496}"/>
                 </a:ext>
               </a:extLst>
             </p:cNvPr>
-            <p:cNvPicPr>
-              <a:picLocks noChangeAspect="1"/>
-            </p:cNvPicPr>
+            <p:cNvSpPr/>
             <p:nvPr/>
-          </p:nvPicPr>
-          <p:blipFill rotWithShape="1">
-            <a:blip r:embed="rId3"/>
-            <a:srcRect b="12977"/>
-            <a:stretch/>
-          </p:blipFill>
+          </p:nvSpPr>
           <p:spPr>
             <a:xfrm>
-              <a:off x="5163075" y="672818"/>
-              <a:ext cx="3620005" cy="2172003"/>
+              <a:off x="9265421" y="5128466"/>
+              <a:ext cx="760895" cy="331078"/>
             </a:xfrm>
             <a:prstGeom prst="rect">
               <a:avLst/>
             </a:prstGeom>
-            <a:ln>
-              <a:noFill/>
+            <a:noFill/>
+            <a:ln w="28575">
+              <a:solidFill>
+                <a:srgbClr val="CA225E"/>
+              </a:solidFill>
             </a:ln>
-            <a:effectLst>
-              <a:outerShdw blurRad="292100" dist="139700" dir="2700000" algn="tl" rotWithShape="0">
-                <a:srgbClr val="333333">
-                  <a:alpha val="65000"/>
-                </a:srgbClr>
-              </a:outerShdw>
-            </a:effectLst>
           </p:spPr>
-        </p:pic>
+          <p:style>
+            <a:lnRef idx="2">
+              <a:schemeClr val="accent1">
+                <a:shade val="50000"/>
+              </a:schemeClr>
+            </a:lnRef>
+            <a:fillRef idx="1">
+              <a:schemeClr val="accent1"/>
+            </a:fillRef>
+            <a:effectRef idx="0">
+              <a:schemeClr val="accent1"/>
+            </a:effectRef>
+            <a:fontRef idx="minor">
+              <a:schemeClr val="lt1"/>
+            </a:fontRef>
+          </p:style>
+          <p:txBody>
+            <a:bodyPr rtlCol="0" anchor="ctr"/>
+            <a:lstStyle/>
+            <a:p>
+              <a:pPr algn="ctr"/>
+              <a:endParaRPr lang="de-DE"/>
+            </a:p>
+          </p:txBody>
+        </p:sp>
       </p:grpSp>
-      <p:sp>
-        <p:nvSpPr>
-          <p:cNvPr id="7" name="Rechteck 6">
-            <a:extLst>
-              <a:ext uri="{FF2B5EF4-FFF2-40B4-BE49-F238E27FC236}">
-                <a16:creationId xmlns:a16="http://schemas.microsoft.com/office/drawing/2014/main" id="{A7330D2F-0C2A-2424-CE69-881D30FD8524}"/>
-              </a:ext>
-            </a:extLst>
-          </p:cNvPr>
-          <p:cNvSpPr/>
-          <p:nvPr/>
-        </p:nvSpPr>
-        <p:spPr>
-          <a:xfrm>
-            <a:off x="5186833" y="1308538"/>
-            <a:ext cx="3436905" cy="583479"/>
-          </a:xfrm>
-          <a:prstGeom prst="rect">
-            <a:avLst/>
-          </a:prstGeom>
-          <a:noFill/>
-          <a:ln w="28575">
-            <a:solidFill>
-              <a:srgbClr val="CA225E"/>
-            </a:solidFill>
-          </a:ln>
-        </p:spPr>
-        <p:style>
-          <a:lnRef idx="2">
-            <a:schemeClr val="accent1">
-              <a:shade val="50000"/>
-            </a:schemeClr>
-          </a:lnRef>
-          <a:fillRef idx="1">
-            <a:schemeClr val="accent1"/>
-          </a:fillRef>
-          <a:effectRef idx="0">
-            <a:schemeClr val="accent1"/>
-          </a:effectRef>
-          <a:fontRef idx="minor">
-            <a:schemeClr val="lt1"/>
-          </a:fontRef>
-        </p:style>
-        <p:txBody>
-          <a:bodyPr rtlCol="0" anchor="ctr"/>
-          <a:lstStyle/>
-          <a:p>
-            <a:pPr algn="ctr"/>
-            <a:r>
-              <a:rPr lang="de-DE" dirty="0">
-                <a:solidFill>
-                  <a:srgbClr val="CA225E"/>
-                </a:solidFill>
-              </a:rPr>
-              <a:t>Konsolen Ausgabe nach dem Ausführen des R Skriptes</a:t>
-            </a:r>
-          </a:p>
-        </p:txBody>
-      </p:sp>
-      <p:sp>
-        <p:nvSpPr>
-          <p:cNvPr id="8" name="Rechteck 7">
-            <a:extLst>
-              <a:ext uri="{FF2B5EF4-FFF2-40B4-BE49-F238E27FC236}">
-                <a16:creationId xmlns:a16="http://schemas.microsoft.com/office/drawing/2014/main" id="{E32F5C09-1CED-562B-2B00-A13403A05310}"/>
-              </a:ext>
-            </a:extLst>
-          </p:cNvPr>
-          <p:cNvSpPr/>
-          <p:nvPr/>
-        </p:nvSpPr>
-        <p:spPr>
-          <a:xfrm>
-            <a:off x="917137" y="1605764"/>
-            <a:ext cx="1150883" cy="331077"/>
-          </a:xfrm>
-          <a:prstGeom prst="rect">
-            <a:avLst/>
-          </a:prstGeom>
-          <a:noFill/>
-          <a:ln w="28575">
-            <a:solidFill>
-              <a:srgbClr val="CA225E"/>
-            </a:solidFill>
-          </a:ln>
-        </p:spPr>
-        <p:style>
-          <a:lnRef idx="2">
-            <a:schemeClr val="accent1">
-              <a:shade val="50000"/>
-            </a:schemeClr>
-          </a:lnRef>
-          <a:fillRef idx="1">
-            <a:schemeClr val="accent1"/>
-          </a:fillRef>
-          <a:effectRef idx="0">
-            <a:schemeClr val="accent1"/>
-          </a:effectRef>
-          <a:fontRef idx="minor">
-            <a:schemeClr val="lt1"/>
-          </a:fontRef>
-        </p:style>
-        <p:txBody>
-          <a:bodyPr rtlCol="0" anchor="ctr"/>
-          <a:lstStyle/>
-          <a:p>
-            <a:pPr algn="ctr"/>
-            <a:r>
-              <a:rPr lang="de-DE" dirty="0">
-                <a:solidFill>
-                  <a:srgbClr val="CA225E"/>
-                </a:solidFill>
-              </a:rPr>
-              <a:t>R Skript</a:t>
-            </a:r>
-          </a:p>
-        </p:txBody>
-      </p:sp>
     </p:spTree>
     <p:extLst>
       <p:ext uri="{BB962C8B-B14F-4D97-AF65-F5344CB8AC3E}">

</xml_diff>

<commit_message>
wanja fixed all the problems :-)
</commit_message>
<xml_diff>
--- a/inst/tutorials/tutorial_2/images/shadow.pptx
+++ b/inst/tutorials/tutorial_2/images/shadow.pptx
@@ -264,7 +264,7 @@
           <a:p>
             <a:fld id="{FA3874A1-BFDD-4839-AF08-EC978EFE8D7D}" type="datetimeFigureOut">
               <a:rPr lang="de-DE" smtClean="0"/>
-              <a:t>19.06.2023</a:t>
+              <a:t>21.06.2023</a:t>
             </a:fld>
             <a:endParaRPr lang="de-DE"/>
           </a:p>
@@ -462,7 +462,7 @@
           <a:p>
             <a:fld id="{FA3874A1-BFDD-4839-AF08-EC978EFE8D7D}" type="datetimeFigureOut">
               <a:rPr lang="de-DE" smtClean="0"/>
-              <a:t>19.06.2023</a:t>
+              <a:t>21.06.2023</a:t>
             </a:fld>
             <a:endParaRPr lang="de-DE"/>
           </a:p>
@@ -670,7 +670,7 @@
           <a:p>
             <a:fld id="{FA3874A1-BFDD-4839-AF08-EC978EFE8D7D}" type="datetimeFigureOut">
               <a:rPr lang="de-DE" smtClean="0"/>
-              <a:t>19.06.2023</a:t>
+              <a:t>21.06.2023</a:t>
             </a:fld>
             <a:endParaRPr lang="de-DE"/>
           </a:p>
@@ -868,7 +868,7 @@
           <a:p>
             <a:fld id="{FA3874A1-BFDD-4839-AF08-EC978EFE8D7D}" type="datetimeFigureOut">
               <a:rPr lang="de-DE" smtClean="0"/>
-              <a:t>19.06.2023</a:t>
+              <a:t>21.06.2023</a:t>
             </a:fld>
             <a:endParaRPr lang="de-DE"/>
           </a:p>
@@ -1143,7 +1143,7 @@
           <a:p>
             <a:fld id="{FA3874A1-BFDD-4839-AF08-EC978EFE8D7D}" type="datetimeFigureOut">
               <a:rPr lang="de-DE" smtClean="0"/>
-              <a:t>19.06.2023</a:t>
+              <a:t>21.06.2023</a:t>
             </a:fld>
             <a:endParaRPr lang="de-DE"/>
           </a:p>
@@ -1408,7 +1408,7 @@
           <a:p>
             <a:fld id="{FA3874A1-BFDD-4839-AF08-EC978EFE8D7D}" type="datetimeFigureOut">
               <a:rPr lang="de-DE" smtClean="0"/>
-              <a:t>19.06.2023</a:t>
+              <a:t>21.06.2023</a:t>
             </a:fld>
             <a:endParaRPr lang="de-DE"/>
           </a:p>
@@ -1820,7 +1820,7 @@
           <a:p>
             <a:fld id="{FA3874A1-BFDD-4839-AF08-EC978EFE8D7D}" type="datetimeFigureOut">
               <a:rPr lang="de-DE" smtClean="0"/>
-              <a:t>19.06.2023</a:t>
+              <a:t>21.06.2023</a:t>
             </a:fld>
             <a:endParaRPr lang="de-DE"/>
           </a:p>
@@ -1961,7 +1961,7 @@
           <a:p>
             <a:fld id="{FA3874A1-BFDD-4839-AF08-EC978EFE8D7D}" type="datetimeFigureOut">
               <a:rPr lang="de-DE" smtClean="0"/>
-              <a:t>19.06.2023</a:t>
+              <a:t>21.06.2023</a:t>
             </a:fld>
             <a:endParaRPr lang="de-DE"/>
           </a:p>
@@ -2074,7 +2074,7 @@
           <a:p>
             <a:fld id="{FA3874A1-BFDD-4839-AF08-EC978EFE8D7D}" type="datetimeFigureOut">
               <a:rPr lang="de-DE" smtClean="0"/>
-              <a:t>19.06.2023</a:t>
+              <a:t>21.06.2023</a:t>
             </a:fld>
             <a:endParaRPr lang="de-DE"/>
           </a:p>
@@ -2385,7 +2385,7 @@
           <a:p>
             <a:fld id="{FA3874A1-BFDD-4839-AF08-EC978EFE8D7D}" type="datetimeFigureOut">
               <a:rPr lang="de-DE" smtClean="0"/>
-              <a:t>19.06.2023</a:t>
+              <a:t>21.06.2023</a:t>
             </a:fld>
             <a:endParaRPr lang="de-DE"/>
           </a:p>
@@ -2673,7 +2673,7 @@
           <a:p>
             <a:fld id="{FA3874A1-BFDD-4839-AF08-EC978EFE8D7D}" type="datetimeFigureOut">
               <a:rPr lang="de-DE" smtClean="0"/>
-              <a:t>19.06.2023</a:t>
+              <a:t>21.06.2023</a:t>
             </a:fld>
             <a:endParaRPr lang="de-DE"/>
           </a:p>
@@ -2914,7 +2914,7 @@
           <a:p>
             <a:fld id="{FA3874A1-BFDD-4839-AF08-EC978EFE8D7D}" type="datetimeFigureOut">
               <a:rPr lang="de-DE" smtClean="0"/>
-              <a:t>19.06.2023</a:t>
+              <a:t>21.06.2023</a:t>
             </a:fld>
             <a:endParaRPr lang="de-DE"/>
           </a:p>
@@ -3350,6 +3350,7 @@
             <a:chOff x="0" y="755001"/>
             <a:chExt cx="12192000" cy="5347997"/>
           </a:xfrm>
+          <a:effectLst/>
         </p:grpSpPr>
         <p:pic>
           <p:nvPicPr>
@@ -3388,13 +3389,7 @@
             <a:ln>
               <a:noFill/>
             </a:ln>
-            <a:effectLst>
-              <a:outerShdw blurRad="292100" dist="139700" dir="2700000" algn="tl" rotWithShape="0">
-                <a:srgbClr val="333333">
-                  <a:alpha val="65000"/>
-                </a:srgbClr>
-              </a:outerShdw>
-            </a:effectLst>
+            <a:effectLst/>
           </p:spPr>
         </p:pic>
         <p:sp>
@@ -3531,13 +3526,7 @@
             <a:ln>
               <a:noFill/>
             </a:ln>
-            <a:effectLst>
-              <a:outerShdw blurRad="292100" dist="139700" dir="2700000" algn="tl" rotWithShape="0">
-                <a:srgbClr val="333333">
-                  <a:alpha val="65000"/>
-                </a:srgbClr>
-              </a:outerShdw>
-            </a:effectLst>
+            <a:effectLst/>
           </p:spPr>
         </p:pic>
         <p:sp>
@@ -3644,13 +3633,7 @@
             <a:ln>
               <a:noFill/>
             </a:ln>
-            <a:effectLst>
-              <a:outerShdw blurRad="292100" dist="139700" dir="2700000" algn="tl" rotWithShape="0">
-                <a:srgbClr val="333333">
-                  <a:alpha val="65000"/>
-                </a:srgbClr>
-              </a:outerShdw>
-            </a:effectLst>
+            <a:effectLst/>
           </p:spPr>
         </p:pic>
         <p:sp>
@@ -3823,13 +3806,7 @@
           <a:ln>
             <a:noFill/>
           </a:ln>
-          <a:effectLst>
-            <a:outerShdw blurRad="292100" dist="139700" dir="2700000" algn="tl" rotWithShape="0">
-              <a:srgbClr val="333333">
-                <a:alpha val="65000"/>
-              </a:srgbClr>
-            </a:outerShdw>
-          </a:effectLst>
+          <a:effectLst/>
         </p:spPr>
       </p:pic>
       <p:sp>
@@ -3846,7 +3823,7 @@
         </p:nvSpPr>
         <p:spPr>
           <a:xfrm>
-            <a:off x="394137" y="265156"/>
+            <a:off x="255592" y="337815"/>
             <a:ext cx="485741" cy="331077"/>
           </a:xfrm>
           <a:prstGeom prst="rect">
@@ -3915,13 +3892,7 @@
           <a:ln>
             <a:noFill/>
           </a:ln>
-          <a:effectLst>
-            <a:outerShdw blurRad="292100" dist="139700" dir="2700000" algn="tl" rotWithShape="0">
-              <a:srgbClr val="333333">
-                <a:alpha val="65000"/>
-              </a:srgbClr>
-            </a:outerShdw>
-          </a:effectLst>
+          <a:effectLst/>
         </p:spPr>
       </p:pic>
     </p:spTree>
@@ -3985,13 +3956,7 @@
           <a:ln>
             <a:noFill/>
           </a:ln>
-          <a:effectLst>
-            <a:outerShdw blurRad="292100" dist="139700" dir="2700000" algn="tl" rotWithShape="0">
-              <a:srgbClr val="333333">
-                <a:alpha val="65000"/>
-              </a:srgbClr>
-            </a:outerShdw>
-          </a:effectLst>
+          <a:effectLst/>
         </p:spPr>
       </p:pic>
       <p:pic>
@@ -4025,13 +3990,7 @@
           <a:ln>
             <a:noFill/>
           </a:ln>
-          <a:effectLst>
-            <a:outerShdw blurRad="292100" dist="139700" dir="2700000" algn="tl" rotWithShape="0">
-              <a:srgbClr val="333333">
-                <a:alpha val="65000"/>
-              </a:srgbClr>
-            </a:outerShdw>
-          </a:effectLst>
+          <a:effectLst/>
         </p:spPr>
       </p:pic>
     </p:spTree>
@@ -4095,13 +4054,7 @@
           <a:ln>
             <a:noFill/>
           </a:ln>
-          <a:effectLst>
-            <a:outerShdw blurRad="292100" dist="139700" dir="2700000" algn="tl" rotWithShape="0">
-              <a:srgbClr val="333333">
-                <a:alpha val="65000"/>
-              </a:srgbClr>
-            </a:outerShdw>
-          </a:effectLst>
+          <a:effectLst/>
         </p:spPr>
       </p:pic>
     </p:spTree>
@@ -4404,13 +4357,7 @@
           <a:ln>
             <a:noFill/>
           </a:ln>
-          <a:effectLst>
-            <a:outerShdw blurRad="292100" dist="139700" dir="2700000" algn="tl" rotWithShape="0">
-              <a:srgbClr val="333333">
-                <a:alpha val="65000"/>
-              </a:srgbClr>
-            </a:outerShdw>
-          </a:effectLst>
+          <a:effectLst/>
         </p:spPr>
       </p:pic>
       <p:grpSp>
@@ -4464,13 +4411,7 @@
             <a:ln>
               <a:noFill/>
             </a:ln>
-            <a:effectLst>
-              <a:outerShdw blurRad="292100" dist="139700" dir="2700000" algn="tl" rotWithShape="0">
-                <a:srgbClr val="333333">
-                  <a:alpha val="65000"/>
-                </a:srgbClr>
-              </a:outerShdw>
-            </a:effectLst>
+            <a:effectLst/>
           </p:spPr>
         </p:pic>
         <p:sp>

</xml_diff>